<commit_message>
finalize csv json load
</commit_message>
<xml_diff>
--- a/CCSC-MW Fall 2024 Conference Tutorial.pptx
+++ b/CCSC-MW Fall 2024 Conference Tutorial.pptx
@@ -191,7 +191,7 @@
 <file path=ppt/revisionInfo.xml><?xml version="1.0" encoding="utf-8"?>
 <p1510:revInfo xmlns:a="http://schemas.openxmlformats.org/drawingml/2006/main" xmlns:r="http://schemas.openxmlformats.org/officeDocument/2006/relationships" xmlns:p1510="http://schemas.microsoft.com/office/powerpoint/2015/10/main">
   <p1510:revLst>
-    <p1510:client id="{AC447AB3-8C2D-884D-BE48-FEB9023B3C20}" v="1" dt="2024-09-26T03:23:23.400"/>
+    <p1510:client id="{AC447AB3-8C2D-884D-BE48-FEB9023B3C20}" v="2" dt="2024-09-29T20:05:05.223"/>
   </p1510:revLst>
 </p1510:revInfo>
 </file>
@@ -1068,7 +1068,7 @@
           <a:p>
             <a:fld id="{52C640F9-5F57-4A56-A18C-41BD23F454DE}" type="datetimeFigureOut">
               <a:rPr lang="en-US" smtClean="0"/>
-              <a:t>9/27/24</a:t>
+              <a:t>9/29/24</a:t>
             </a:fld>
             <a:endParaRPr lang="en-US" dirty="0"/>
           </a:p>
@@ -4679,7 +4679,7 @@
           <a:p>
             <a:fld id="{6DAF16FE-B93F-47FF-95FE-4BD6A1B07446}" type="datetimeFigureOut">
               <a:rPr lang="en-US" smtClean="0"/>
-              <a:t>9/27/24</a:t>
+              <a:t>9/29/24</a:t>
             </a:fld>
             <a:endParaRPr lang="en-US" dirty="0"/>
           </a:p>

</xml_diff>